<commit_message>
added precision and acuracy values
</commit_message>
<xml_diff>
--- a/Presentation1.pptx
+++ b/Presentation1.pptx
@@ -9,6 +9,9 @@
     <p:sldId id="259" r:id="rId3"/>
     <p:sldId id="257" r:id="rId4"/>
     <p:sldId id="258" r:id="rId5"/>
+    <p:sldId id="260" r:id="rId6"/>
+    <p:sldId id="262" r:id="rId7"/>
+    <p:sldId id="263" r:id="rId8"/>
   </p:sldIdLst>
   <p:sldSz cx="12192000" cy="6858000"/>
   <p:notesSz cx="6858000" cy="9144000"/>
@@ -107,6 +110,11 @@
       </a:defRPr>
     </a:lvl9pPr>
   </p:defaultTextStyle>
+  <p:extLst>
+    <p:ext uri="{EFAFB233-063F-42B5-8137-9DF3F51BA10A}">
+      <p15:sldGuideLst xmlns:p15="http://schemas.microsoft.com/office/powerpoint/2012/main"/>
+    </p:ext>
+  </p:extLst>
 </p:presentation>
 </file>
 
@@ -456,11 +464,11 @@
           <c:showPercent val="0"/>
           <c:showBubbleSize val="0"/>
         </c:dLbls>
-        <c:axId val="875604096"/>
-        <c:axId val="875593760"/>
+        <c:axId val="-1906137536"/>
+        <c:axId val="-1906143520"/>
       </c:scatterChart>
       <c:valAx>
-        <c:axId val="875604096"/>
+        <c:axId val="-1906137536"/>
         <c:scaling>
           <c:orientation val="minMax"/>
         </c:scaling>
@@ -577,12 +585,12 @@
             <a:endParaRPr lang="en-US"/>
           </a:p>
         </c:txPr>
-        <c:crossAx val="875593760"/>
+        <c:crossAx val="-1906143520"/>
         <c:crosses val="autoZero"/>
         <c:crossBetween val="midCat"/>
       </c:valAx>
       <c:valAx>
-        <c:axId val="875593760"/>
+        <c:axId val="-1906143520"/>
         <c:scaling>
           <c:orientation val="minMax"/>
           <c:min val="0.19000000000000003"/>
@@ -701,7 +709,7 @@
             <a:endParaRPr lang="en-US"/>
           </a:p>
         </c:txPr>
-        <c:crossAx val="875604096"/>
+        <c:crossAx val="-1906137536"/>
         <c:crosses val="autoZero"/>
         <c:crossBetween val="midCat"/>
       </c:valAx>
@@ -7336,74 +7344,80 @@
         </p:nvSpPr>
         <p:spPr/>
         <p:txBody>
-          <a:bodyPr/>
-          <a:lstStyle/>
-          <a:p>
-            <a:r>
-              <a:rPr lang="en-US" dirty="0" smtClean="0"/>
-              <a:t>With the 3ml Syringe attached</a:t>
+          <a:bodyPr>
+            <a:normAutofit/>
+          </a:bodyPr>
+          <a:lstStyle/>
+          <a:p>
+            <a:r>
+              <a:rPr lang="en-US" cap="none" dirty="0" smtClean="0"/>
+              <a:t>With the 3mL Syringe </a:t>
+            </a:r>
+            <a:r>
+              <a:rPr lang="en-US" cap="none" dirty="0"/>
+              <a:t>A</a:t>
+            </a:r>
+            <a:r>
+              <a:rPr lang="en-US" cap="none" dirty="0" smtClean="0"/>
+              <a:t>ttached</a:t>
             </a:r>
           </a:p>
           <a:p>
             <a:pPr lvl="1"/>
             <a:r>
-              <a:rPr lang="en-US" dirty="0" smtClean="0">
+              <a:rPr lang="en-US" cap="none" dirty="0" smtClean="0">
                 <a:latin typeface="Calibri" panose="020F0502020204030204" pitchFamily="34" charset="0"/>
               </a:rPr>
-              <a:t>1 </a:t>
-            </a:r>
-            <a:r>
-              <a:rPr lang="en-US" dirty="0" err="1" smtClean="0">
+              <a:t>Dispense up to 1 ml or 1000 </a:t>
+            </a:r>
+            <a:r>
+              <a:rPr lang="en-US" cap="none" dirty="0" err="1" smtClean="0">
                 <a:latin typeface="Calibri" panose="020F0502020204030204" pitchFamily="34" charset="0"/>
               </a:rPr>
-              <a:t>mililiter</a:t>
-            </a:r>
-            <a:r>
-              <a:rPr lang="en-US" dirty="0" smtClean="0">
-                <a:latin typeface="Calibri" panose="020F0502020204030204" pitchFamily="34" charset="0"/>
-              </a:rPr>
-              <a:t> or 1000 microliters</a:t>
-            </a:r>
-            <a:endParaRPr lang="en-US" dirty="0">
+              <a:t>ul</a:t>
+            </a:r>
+            <a:endParaRPr lang="en-US" cap="none" dirty="0" smtClean="0">
               <a:latin typeface="Calibri" panose="020F0502020204030204" pitchFamily="34" charset="0"/>
             </a:endParaRPr>
           </a:p>
           <a:p>
             <a:pPr lvl="1"/>
             <a:r>
-              <a:rPr lang="en-US" dirty="0"/>
+              <a:rPr lang="en-US" cap="none" dirty="0" smtClean="0"/>
               <a:t>Depending on the syringe:</a:t>
             </a:r>
           </a:p>
           <a:p>
             <a:pPr lvl="2"/>
             <a:r>
-              <a:rPr lang="en-US" dirty="0"/>
-              <a:t>Measure up in 100ul</a:t>
+              <a:rPr lang="en-US" cap="none" dirty="0" smtClean="0"/>
+              <a:t>Measure in increments of 100ul</a:t>
+            </a:r>
+          </a:p>
+          <a:p>
+            <a:r>
+              <a:rPr lang="en-US" cap="none" dirty="0" smtClean="0"/>
+              <a:t> With 1ml SYRINGE Attached</a:t>
             </a:r>
           </a:p>
           <a:p>
             <a:pPr lvl="1"/>
-            <a:endParaRPr lang="en-US" dirty="0" smtClean="0">
-              <a:latin typeface="Calibri" panose="020F0502020204030204" pitchFamily="34" charset="0"/>
-            </a:endParaRPr>
+            <a:r>
+              <a:rPr lang="en-US" cap="none" dirty="0" smtClean="0"/>
+              <a:t>Dispense up to .35mL or 350uL</a:t>
+            </a:r>
           </a:p>
           <a:p>
             <a:pPr lvl="1"/>
             <a:r>
-              <a:rPr lang="en-US" dirty="0" smtClean="0"/>
-              <a:t>Depending on the syringe:</a:t>
-            </a:r>
-          </a:p>
-          <a:p>
-            <a:pPr lvl="2"/>
-            <a:r>
-              <a:rPr lang="en-US" dirty="0" smtClean="0"/>
-              <a:t>Measure up in 100ul</a:t>
-            </a:r>
-          </a:p>
-          <a:p>
-            <a:pPr lvl="2"/>
+              <a:rPr lang="en-US" cap="none" dirty="0" smtClean="0"/>
+              <a:t>Measure in increments of 10uL</a:t>
+            </a:r>
+          </a:p>
+          <a:p>
+            <a:pPr marL="0" indent="0">
+              <a:buNone/>
+            </a:pPr>
             <a:endParaRPr lang="en-US" dirty="0"/>
           </a:p>
           <a:p>
@@ -7529,14 +7543,19 @@
               <a:rPr lang="en-US" dirty="0" smtClean="0">
                 <a:latin typeface="Calibri" panose="020F0502020204030204" pitchFamily="34" charset="0"/>
               </a:rPr>
-              <a:t>Fix it by adding </a:t>
-            </a:r>
-            <a:r>
-              <a:rPr lang="en-US" dirty="0" err="1" smtClean="0">
+              <a:t>Fix </a:t>
+            </a:r>
+            <a:r>
+              <a:rPr lang="en-US" dirty="0" smtClean="0">
                 <a:latin typeface="Calibri" panose="020F0502020204030204" pitchFamily="34" charset="0"/>
               </a:rPr>
-              <a:t>locktite</a:t>
-            </a:r>
+              <a:t>Replacing the nut with a locking nut</a:t>
+            </a:r>
+          </a:p>
+          <a:p>
+            <a:pPr marL="0" indent="0">
+              <a:buNone/>
+            </a:pPr>
             <a:endParaRPr lang="en-US" dirty="0" smtClean="0">
               <a:latin typeface="Calibri" panose="020F0502020204030204" pitchFamily="34" charset="0"/>
             </a:endParaRPr>
@@ -7570,6 +7589,47 @@
           </a:graphicData>
         </a:graphic>
       </p:graphicFrame>
+      <p:pic>
+        <p:nvPicPr>
+          <p:cNvPr id="1028" name="Picture 4" descr="http://www.nutmanufacturers.com/picture/lock-nuts/locking-nut.jpg"/>
+          <p:cNvPicPr>
+            <a:picLocks noChangeAspect="1" noChangeArrowheads="1"/>
+          </p:cNvPicPr>
+          <p:nvPr/>
+        </p:nvPicPr>
+        <p:blipFill>
+          <a:blip r:embed="rId3">
+            <a:extLst>
+              <a:ext uri="{28A0092B-C50C-407E-A947-70E740481C1C}">
+                <a14:useLocalDpi xmlns:a14="http://schemas.microsoft.com/office/drawing/2010/main" val="0"/>
+              </a:ext>
+            </a:extLst>
+          </a:blip>
+          <a:srcRect/>
+          <a:stretch>
+            <a:fillRect/>
+          </a:stretch>
+        </p:blipFill>
+        <p:spPr bwMode="auto">
+          <a:xfrm>
+            <a:off x="1655602" y="4274048"/>
+            <a:ext cx="1342489" cy="1342489"/>
+          </a:xfrm>
+          <a:prstGeom prst="rect">
+            <a:avLst/>
+          </a:prstGeom>
+          <a:noFill/>
+          <a:extLst>
+            <a:ext uri="{909E8E84-426E-40DD-AFC4-6F175D3DCCD1}">
+              <a14:hiddenFill xmlns:a14="http://schemas.microsoft.com/office/drawing/2010/main">
+                <a:solidFill>
+                  <a:srgbClr val="FFFFFF"/>
+                </a:solidFill>
+              </a14:hiddenFill>
+            </a:ext>
+          </a:extLst>
+        </p:spPr>
+      </p:pic>
     </p:spTree>
     <p:extLst>
       <p:ext uri="{BB962C8B-B14F-4D97-AF65-F5344CB8AC3E}">
@@ -7615,6 +7675,10 @@
           <a:bodyPr/>
           <a:lstStyle/>
           <a:p>
+            <a:r>
+              <a:rPr lang="en-US" dirty="0" smtClean="0"/>
+              <a:t>Testing</a:t>
+            </a:r>
             <a:endParaRPr lang="en-US" dirty="0"/>
           </a:p>
         </p:txBody>
@@ -7631,10 +7695,162 @@
         </p:nvSpPr>
         <p:spPr/>
         <p:txBody>
-          <a:bodyPr/>
-          <a:lstStyle/>
-          <a:p>
-            <a:endParaRPr lang="en-US"/>
+          <a:bodyPr>
+            <a:normAutofit fontScale="92500" lnSpcReduction="10000"/>
+          </a:bodyPr>
+          <a:lstStyle/>
+          <a:p>
+            <a:r>
+              <a:rPr lang="en-US" dirty="0"/>
+              <a:t>To test the </a:t>
+            </a:r>
+            <a:r>
+              <a:rPr lang="en-US" dirty="0" smtClean="0"/>
+              <a:t>commercial pipettes against ours we performed 10 trials at various amounts</a:t>
+            </a:r>
+            <a:endParaRPr lang="en-US" cap="none" dirty="0"/>
+          </a:p>
+          <a:p>
+            <a:r>
+              <a:rPr lang="en-US" dirty="0" smtClean="0"/>
+              <a:t>To </a:t>
+            </a:r>
+            <a:r>
+              <a:rPr lang="en-US" dirty="0"/>
+              <a:t>test the 100-1000</a:t>
+            </a:r>
+            <a:r>
+              <a:rPr lang="en-US" cap="none" dirty="0"/>
+              <a:t>uL</a:t>
+            </a:r>
+            <a:r>
+              <a:rPr lang="en-US" dirty="0"/>
+              <a:t> Pipette against ours we set both pipettes to </a:t>
+            </a:r>
+            <a:r>
+              <a:rPr lang="en-US" dirty="0" smtClean="0"/>
+              <a:t>200</a:t>
+            </a:r>
+            <a:r>
+              <a:rPr lang="en-US" cap="none" dirty="0" smtClean="0"/>
+              <a:t>uL</a:t>
+            </a:r>
+          </a:p>
+          <a:p>
+            <a:pPr lvl="1"/>
+            <a:r>
+              <a:rPr lang="en-US" cap="none" dirty="0" smtClean="0"/>
+              <a:t>weighed </a:t>
+            </a:r>
+            <a:r>
+              <a:rPr lang="en-US" cap="none" dirty="0"/>
+              <a:t>the dispensed liquid in grams</a:t>
+            </a:r>
+          </a:p>
+          <a:p>
+            <a:pPr marL="457200" lvl="1" indent="0">
+              <a:buNone/>
+            </a:pPr>
+            <a:r>
+              <a:rPr lang="en-US" cap="none" dirty="0" smtClean="0"/>
+              <a:t>	Theoretical </a:t>
+            </a:r>
+            <a:r>
+              <a:rPr lang="en-US" cap="none" dirty="0"/>
+              <a:t>weight : </a:t>
+            </a:r>
+            <a:r>
+              <a:rPr lang="en-US" cap="none" dirty="0" smtClean="0"/>
+              <a:t>0.1999g</a:t>
+            </a:r>
+          </a:p>
+          <a:p>
+            <a:r>
+              <a:rPr lang="en-US" cap="none" dirty="0" smtClean="0"/>
+              <a:t> </a:t>
+            </a:r>
+            <a:r>
+              <a:rPr lang="en-US" dirty="0"/>
+              <a:t>To test the </a:t>
+            </a:r>
+            <a:r>
+              <a:rPr lang="en-US" dirty="0" smtClean="0"/>
+              <a:t>10-100</a:t>
+            </a:r>
+            <a:r>
+              <a:rPr lang="en-US" cap="none" dirty="0" smtClean="0"/>
+              <a:t>uL</a:t>
+            </a:r>
+            <a:r>
+              <a:rPr lang="en-US" dirty="0" smtClean="0"/>
+              <a:t> </a:t>
+            </a:r>
+            <a:r>
+              <a:rPr lang="en-US" dirty="0"/>
+              <a:t>Pipette against ours we set both pipettes to </a:t>
+            </a:r>
+            <a:r>
+              <a:rPr lang="en-US" dirty="0" smtClean="0"/>
+              <a:t>50</a:t>
+            </a:r>
+            <a:r>
+              <a:rPr lang="en-US" cap="none" dirty="0" smtClean="0"/>
+              <a:t>uL and to 20uL</a:t>
+            </a:r>
+            <a:endParaRPr lang="en-US" cap="none" dirty="0"/>
+          </a:p>
+          <a:p>
+            <a:pPr lvl="1"/>
+            <a:r>
+              <a:rPr lang="en-US" cap="none" dirty="0" smtClean="0"/>
+              <a:t>weighed </a:t>
+            </a:r>
+            <a:r>
+              <a:rPr lang="en-US" cap="none" dirty="0"/>
+              <a:t>the dispensed liquid in </a:t>
+            </a:r>
+            <a:r>
+              <a:rPr lang="en-US" cap="none" dirty="0" smtClean="0"/>
+              <a:t>grams</a:t>
+            </a:r>
+          </a:p>
+          <a:p>
+            <a:pPr lvl="2"/>
+            <a:r>
+              <a:rPr lang="en-US" cap="none" dirty="0" smtClean="0"/>
+              <a:t>Theoretical </a:t>
+            </a:r>
+            <a:r>
+              <a:rPr lang="en-US" cap="none" dirty="0"/>
+              <a:t>weight </a:t>
+            </a:r>
+            <a:r>
+              <a:rPr lang="en-US" cap="none" dirty="0" smtClean="0"/>
+              <a:t>(50uL) = 0.049999g</a:t>
+            </a:r>
+          </a:p>
+          <a:p>
+            <a:pPr lvl="2"/>
+            <a:r>
+              <a:rPr lang="en-US" cap="none" dirty="0" smtClean="0"/>
+              <a:t>Theoretical weight (20uL) = 0.019999g</a:t>
+            </a:r>
+          </a:p>
+          <a:p>
+            <a:pPr marL="457200" lvl="1" indent="0">
+              <a:buNone/>
+            </a:pPr>
+            <a:endParaRPr lang="en-US" cap="none" dirty="0"/>
+          </a:p>
+          <a:p>
+            <a:endParaRPr lang="en-US" cap="none" dirty="0" smtClean="0"/>
+          </a:p>
+          <a:p>
+            <a:endParaRPr lang="en-US" cap="none" dirty="0" smtClean="0"/>
+          </a:p>
+          <a:p>
+            <a:pPr lvl="1"/>
+            <a:endParaRPr lang="en-US" dirty="0"/>
           </a:p>
         </p:txBody>
       </p:sp>
@@ -7642,6 +7858,610 @@
     <p:extLst>
       <p:ext uri="{BB962C8B-B14F-4D97-AF65-F5344CB8AC3E}">
         <p14:creationId xmlns:p14="http://schemas.microsoft.com/office/powerpoint/2010/main" val="1825872503"/>
+      </p:ext>
+    </p:extLst>
+  </p:cSld>
+  <p:clrMapOvr>
+    <a:masterClrMapping/>
+  </p:clrMapOvr>
+</p:sld>
+</file>
+
+<file path=ppt/slides/slide5.xml><?xml version="1.0" encoding="utf-8"?>
+<p:sld xmlns:a="http://schemas.openxmlformats.org/drawingml/2006/main" xmlns:r="http://schemas.openxmlformats.org/officeDocument/2006/relationships" xmlns:p="http://schemas.openxmlformats.org/presentationml/2006/main">
+  <p:cSld>
+    <p:spTree>
+      <p:nvGrpSpPr>
+        <p:cNvPr id="1" name=""/>
+        <p:cNvGrpSpPr/>
+        <p:nvPr/>
+      </p:nvGrpSpPr>
+      <p:grpSpPr>
+        <a:xfrm>
+          <a:off x="0" y="0"/>
+          <a:ext cx="0" cy="0"/>
+          <a:chOff x="0" y="0"/>
+          <a:chExt cx="0" cy="0"/>
+        </a:xfrm>
+      </p:grpSpPr>
+      <p:sp>
+        <p:nvSpPr>
+          <p:cNvPr id="2" name="Title 1"/>
+          <p:cNvSpPr>
+            <a:spLocks noGrp="1"/>
+          </p:cNvSpPr>
+          <p:nvPr>
+            <p:ph type="title"/>
+          </p:nvPr>
+        </p:nvSpPr>
+        <p:spPr/>
+        <p:txBody>
+          <a:bodyPr/>
+          <a:lstStyle/>
+          <a:p>
+            <a:r>
+              <a:rPr lang="en-US" cap="none" dirty="0" smtClean="0"/>
+              <a:t>200uL</a:t>
+            </a:r>
+            <a:endParaRPr lang="en-US" cap="none" dirty="0"/>
+          </a:p>
+        </p:txBody>
+      </p:sp>
+      <p:sp>
+        <p:nvSpPr>
+          <p:cNvPr id="3" name="Text Placeholder 2"/>
+          <p:cNvSpPr>
+            <a:spLocks noGrp="1"/>
+          </p:cNvSpPr>
+          <p:nvPr>
+            <p:ph type="body" idx="1"/>
+          </p:nvPr>
+        </p:nvSpPr>
+        <p:spPr/>
+        <p:txBody>
+          <a:bodyPr/>
+          <a:lstStyle/>
+          <a:p>
+            <a:r>
+              <a:rPr lang="en-US" dirty="0" smtClean="0"/>
+              <a:t>Commercial pipette	</a:t>
+            </a:r>
+            <a:endParaRPr lang="en-US" dirty="0"/>
+          </a:p>
+        </p:txBody>
+      </p:sp>
+      <p:sp>
+        <p:nvSpPr>
+          <p:cNvPr id="4" name="Content Placeholder 3"/>
+          <p:cNvSpPr>
+            <a:spLocks noGrp="1"/>
+          </p:cNvSpPr>
+          <p:nvPr>
+            <p:ph sz="quarter" idx="13"/>
+          </p:nvPr>
+        </p:nvSpPr>
+        <p:spPr/>
+        <p:txBody>
+          <a:bodyPr/>
+          <a:lstStyle/>
+          <a:p>
+            <a:r>
+              <a:rPr lang="en-US" dirty="0" smtClean="0"/>
+              <a:t>Average of ten trial :                0.20446 </a:t>
+            </a:r>
+          </a:p>
+          <a:p>
+            <a:r>
+              <a:rPr lang="en-US" dirty="0" smtClean="0"/>
+              <a:t>Percent Error:                            2.233%</a:t>
+            </a:r>
+          </a:p>
+          <a:p>
+            <a:r>
+              <a:rPr lang="en-US" dirty="0" smtClean="0"/>
+              <a:t>Standard Deviation :                 0.00291</a:t>
+            </a:r>
+          </a:p>
+          <a:p>
+            <a:r>
+              <a:rPr lang="en-US" dirty="0" smtClean="0"/>
+              <a:t>Percent Standard Deviation:   1.4215%</a:t>
+            </a:r>
+          </a:p>
+        </p:txBody>
+      </p:sp>
+      <p:sp>
+        <p:nvSpPr>
+          <p:cNvPr id="5" name="Text Placeholder 4"/>
+          <p:cNvSpPr>
+            <a:spLocks noGrp="1"/>
+          </p:cNvSpPr>
+          <p:nvPr>
+            <p:ph type="body" sz="quarter" idx="3"/>
+          </p:nvPr>
+        </p:nvSpPr>
+        <p:spPr/>
+        <p:txBody>
+          <a:bodyPr/>
+          <a:lstStyle/>
+          <a:p>
+            <a:r>
+              <a:rPr lang="en-US" dirty="0" smtClean="0"/>
+              <a:t>Test pipette</a:t>
+            </a:r>
+            <a:endParaRPr lang="en-US" dirty="0"/>
+          </a:p>
+        </p:txBody>
+      </p:sp>
+      <p:sp>
+        <p:nvSpPr>
+          <p:cNvPr id="6" name="Content Placeholder 5"/>
+          <p:cNvSpPr>
+            <a:spLocks noGrp="1"/>
+          </p:cNvSpPr>
+          <p:nvPr>
+            <p:ph sz="quarter" idx="14"/>
+          </p:nvPr>
+        </p:nvSpPr>
+        <p:spPr/>
+        <p:txBody>
+          <a:bodyPr/>
+          <a:lstStyle/>
+          <a:p>
+            <a:r>
+              <a:rPr lang="en-US" dirty="0"/>
+              <a:t>Average of ten trial :                 </a:t>
+            </a:r>
+            <a:r>
+              <a:rPr lang="en-US" dirty="0" smtClean="0"/>
+              <a:t>0.19724</a:t>
+            </a:r>
+            <a:endParaRPr lang="en-US" dirty="0"/>
+          </a:p>
+          <a:p>
+            <a:r>
+              <a:rPr lang="en-US" dirty="0"/>
+              <a:t>Percent Error:                             </a:t>
+            </a:r>
+            <a:r>
+              <a:rPr lang="en-US" dirty="0" smtClean="0"/>
+              <a:t>-1.377%</a:t>
+            </a:r>
+            <a:endParaRPr lang="en-US" dirty="0"/>
+          </a:p>
+          <a:p>
+            <a:r>
+              <a:rPr lang="en-US" dirty="0"/>
+              <a:t>Standard Deviation :                  </a:t>
+            </a:r>
+            <a:r>
+              <a:rPr lang="en-US" dirty="0" smtClean="0"/>
+              <a:t>0.00485</a:t>
+            </a:r>
+            <a:endParaRPr lang="en-US" dirty="0"/>
+          </a:p>
+          <a:p>
+            <a:r>
+              <a:rPr lang="en-US" dirty="0"/>
+              <a:t>Percent Standard Deviation:    </a:t>
+            </a:r>
+            <a:r>
+              <a:rPr lang="en-US" dirty="0" smtClean="0"/>
+              <a:t>2.4588%</a:t>
+            </a:r>
+            <a:endParaRPr lang="en-US" dirty="0"/>
+          </a:p>
+          <a:p>
+            <a:endParaRPr lang="en-US" dirty="0"/>
+          </a:p>
+        </p:txBody>
+      </p:sp>
+    </p:spTree>
+    <p:extLst>
+      <p:ext uri="{BB962C8B-B14F-4D97-AF65-F5344CB8AC3E}">
+        <p14:creationId xmlns:p14="http://schemas.microsoft.com/office/powerpoint/2010/main" val="4068384317"/>
+      </p:ext>
+    </p:extLst>
+  </p:cSld>
+  <p:clrMapOvr>
+    <a:masterClrMapping/>
+  </p:clrMapOvr>
+</p:sld>
+</file>
+
+<file path=ppt/slides/slide6.xml><?xml version="1.0" encoding="utf-8"?>
+<p:sld xmlns:a="http://schemas.openxmlformats.org/drawingml/2006/main" xmlns:r="http://schemas.openxmlformats.org/officeDocument/2006/relationships" xmlns:p="http://schemas.openxmlformats.org/presentationml/2006/main">
+  <p:cSld>
+    <p:spTree>
+      <p:nvGrpSpPr>
+        <p:cNvPr id="1" name=""/>
+        <p:cNvGrpSpPr/>
+        <p:nvPr/>
+      </p:nvGrpSpPr>
+      <p:grpSpPr>
+        <a:xfrm>
+          <a:off x="0" y="0"/>
+          <a:ext cx="0" cy="0"/>
+          <a:chOff x="0" y="0"/>
+          <a:chExt cx="0" cy="0"/>
+        </a:xfrm>
+      </p:grpSpPr>
+      <p:sp>
+        <p:nvSpPr>
+          <p:cNvPr id="2" name="Title 1"/>
+          <p:cNvSpPr>
+            <a:spLocks noGrp="1"/>
+          </p:cNvSpPr>
+          <p:nvPr>
+            <p:ph type="title"/>
+          </p:nvPr>
+        </p:nvSpPr>
+        <p:spPr/>
+        <p:txBody>
+          <a:bodyPr/>
+          <a:lstStyle/>
+          <a:p>
+            <a:r>
+              <a:rPr lang="en-US" cap="none" dirty="0" smtClean="0"/>
+              <a:t>50uL</a:t>
+            </a:r>
+            <a:endParaRPr lang="en-US" cap="none" dirty="0"/>
+          </a:p>
+        </p:txBody>
+      </p:sp>
+      <p:sp>
+        <p:nvSpPr>
+          <p:cNvPr id="3" name="Text Placeholder 2"/>
+          <p:cNvSpPr>
+            <a:spLocks noGrp="1"/>
+          </p:cNvSpPr>
+          <p:nvPr>
+            <p:ph type="body" idx="1"/>
+          </p:nvPr>
+        </p:nvSpPr>
+        <p:spPr/>
+        <p:txBody>
+          <a:bodyPr/>
+          <a:lstStyle/>
+          <a:p>
+            <a:r>
+              <a:rPr lang="en-US" dirty="0" smtClean="0"/>
+              <a:t>Commercial pipette	</a:t>
+            </a:r>
+            <a:endParaRPr lang="en-US" dirty="0"/>
+          </a:p>
+        </p:txBody>
+      </p:sp>
+      <p:sp>
+        <p:nvSpPr>
+          <p:cNvPr id="4" name="Content Placeholder 3"/>
+          <p:cNvSpPr>
+            <a:spLocks noGrp="1"/>
+          </p:cNvSpPr>
+          <p:nvPr>
+            <p:ph sz="quarter" idx="13"/>
+          </p:nvPr>
+        </p:nvSpPr>
+        <p:spPr/>
+        <p:txBody>
+          <a:bodyPr/>
+          <a:lstStyle/>
+          <a:p>
+            <a:r>
+              <a:rPr lang="en-US" dirty="0" smtClean="0"/>
+              <a:t>Average of ten trial :                0.0499 </a:t>
+            </a:r>
+          </a:p>
+          <a:p>
+            <a:r>
+              <a:rPr lang="en-US" dirty="0" smtClean="0"/>
+              <a:t>Percent Error:                           -0.197%</a:t>
+            </a:r>
+          </a:p>
+          <a:p>
+            <a:r>
+              <a:rPr lang="en-US" dirty="0" smtClean="0"/>
+              <a:t>Standard Deviation :                 0.00014</a:t>
+            </a:r>
+          </a:p>
+          <a:p>
+            <a:r>
+              <a:rPr lang="en-US" dirty="0" smtClean="0"/>
+              <a:t>Percent Standard Deviation:   0.2834%</a:t>
+            </a:r>
+          </a:p>
+        </p:txBody>
+      </p:sp>
+      <p:sp>
+        <p:nvSpPr>
+          <p:cNvPr id="5" name="Text Placeholder 4"/>
+          <p:cNvSpPr>
+            <a:spLocks noGrp="1"/>
+          </p:cNvSpPr>
+          <p:nvPr>
+            <p:ph type="body" sz="quarter" idx="3"/>
+          </p:nvPr>
+        </p:nvSpPr>
+        <p:spPr/>
+        <p:txBody>
+          <a:bodyPr/>
+          <a:lstStyle/>
+          <a:p>
+            <a:r>
+              <a:rPr lang="en-US" dirty="0" smtClean="0"/>
+              <a:t>Test pipette</a:t>
+            </a:r>
+            <a:endParaRPr lang="en-US" dirty="0"/>
+          </a:p>
+        </p:txBody>
+      </p:sp>
+      <p:sp>
+        <p:nvSpPr>
+          <p:cNvPr id="6" name="Content Placeholder 5"/>
+          <p:cNvSpPr>
+            <a:spLocks noGrp="1"/>
+          </p:cNvSpPr>
+          <p:nvPr>
+            <p:ph sz="quarter" idx="14"/>
+          </p:nvPr>
+        </p:nvSpPr>
+        <p:spPr/>
+        <p:txBody>
+          <a:bodyPr/>
+          <a:lstStyle/>
+          <a:p>
+            <a:r>
+              <a:rPr lang="en-US" dirty="0"/>
+              <a:t>Average of ten trial :                 </a:t>
+            </a:r>
+            <a:r>
+              <a:rPr lang="en-US" dirty="0" smtClean="0"/>
+              <a:t>0.05315</a:t>
+            </a:r>
+            <a:endParaRPr lang="en-US" dirty="0"/>
+          </a:p>
+          <a:p>
+            <a:r>
+              <a:rPr lang="en-US" dirty="0"/>
+              <a:t>Percent Error:                             </a:t>
+            </a:r>
+            <a:r>
+              <a:rPr lang="en-US" dirty="0" smtClean="0"/>
+              <a:t>6.303%</a:t>
+            </a:r>
+            <a:endParaRPr lang="en-US" dirty="0"/>
+          </a:p>
+          <a:p>
+            <a:r>
+              <a:rPr lang="en-US" dirty="0"/>
+              <a:t>Standard Deviation :                  </a:t>
+            </a:r>
+            <a:r>
+              <a:rPr lang="en-US" dirty="0" smtClean="0"/>
+              <a:t>0.00195</a:t>
+            </a:r>
+            <a:endParaRPr lang="en-US" dirty="0"/>
+          </a:p>
+          <a:p>
+            <a:r>
+              <a:rPr lang="en-US" dirty="0"/>
+              <a:t>Percent Standard Deviation:    </a:t>
+            </a:r>
+            <a:r>
+              <a:rPr lang="en-US" dirty="0" smtClean="0"/>
+              <a:t>3.6754%</a:t>
+            </a:r>
+            <a:endParaRPr lang="en-US" dirty="0"/>
+          </a:p>
+          <a:p>
+            <a:endParaRPr lang="en-US" dirty="0"/>
+          </a:p>
+        </p:txBody>
+      </p:sp>
+    </p:spTree>
+    <p:extLst>
+      <p:ext uri="{BB962C8B-B14F-4D97-AF65-F5344CB8AC3E}">
+        <p14:creationId xmlns:p14="http://schemas.microsoft.com/office/powerpoint/2010/main" val="3406382562"/>
+      </p:ext>
+    </p:extLst>
+  </p:cSld>
+  <p:clrMapOvr>
+    <a:masterClrMapping/>
+  </p:clrMapOvr>
+</p:sld>
+</file>
+
+<file path=ppt/slides/slide7.xml><?xml version="1.0" encoding="utf-8"?>
+<p:sld xmlns:a="http://schemas.openxmlformats.org/drawingml/2006/main" xmlns:r="http://schemas.openxmlformats.org/officeDocument/2006/relationships" xmlns:p="http://schemas.openxmlformats.org/presentationml/2006/main">
+  <p:cSld>
+    <p:spTree>
+      <p:nvGrpSpPr>
+        <p:cNvPr id="1" name=""/>
+        <p:cNvGrpSpPr/>
+        <p:nvPr/>
+      </p:nvGrpSpPr>
+      <p:grpSpPr>
+        <a:xfrm>
+          <a:off x="0" y="0"/>
+          <a:ext cx="0" cy="0"/>
+          <a:chOff x="0" y="0"/>
+          <a:chExt cx="0" cy="0"/>
+        </a:xfrm>
+      </p:grpSpPr>
+      <p:sp>
+        <p:nvSpPr>
+          <p:cNvPr id="2" name="Title 1"/>
+          <p:cNvSpPr>
+            <a:spLocks noGrp="1"/>
+          </p:cNvSpPr>
+          <p:nvPr>
+            <p:ph type="title"/>
+          </p:nvPr>
+        </p:nvSpPr>
+        <p:spPr/>
+        <p:txBody>
+          <a:bodyPr/>
+          <a:lstStyle/>
+          <a:p>
+            <a:r>
+              <a:rPr lang="en-US" cap="none" dirty="0" smtClean="0"/>
+              <a:t>20uL</a:t>
+            </a:r>
+            <a:endParaRPr lang="en-US" cap="none" dirty="0"/>
+          </a:p>
+        </p:txBody>
+      </p:sp>
+      <p:sp>
+        <p:nvSpPr>
+          <p:cNvPr id="3" name="Text Placeholder 2"/>
+          <p:cNvSpPr>
+            <a:spLocks noGrp="1"/>
+          </p:cNvSpPr>
+          <p:nvPr>
+            <p:ph type="body" idx="1"/>
+          </p:nvPr>
+        </p:nvSpPr>
+        <p:spPr/>
+        <p:txBody>
+          <a:bodyPr/>
+          <a:lstStyle/>
+          <a:p>
+            <a:r>
+              <a:rPr lang="en-US" dirty="0" smtClean="0"/>
+              <a:t>Commercial pipette	</a:t>
+            </a:r>
+            <a:endParaRPr lang="en-US" dirty="0"/>
+          </a:p>
+        </p:txBody>
+      </p:sp>
+      <p:sp>
+        <p:nvSpPr>
+          <p:cNvPr id="4" name="Content Placeholder 3"/>
+          <p:cNvSpPr>
+            <a:spLocks noGrp="1"/>
+          </p:cNvSpPr>
+          <p:nvPr>
+            <p:ph sz="quarter" idx="13"/>
+          </p:nvPr>
+        </p:nvSpPr>
+        <p:spPr/>
+        <p:txBody>
+          <a:bodyPr/>
+          <a:lstStyle/>
+          <a:p>
+            <a:r>
+              <a:rPr lang="en-US" dirty="0" smtClean="0"/>
+              <a:t>Average of ten trial :                0.01983 </a:t>
+            </a:r>
+          </a:p>
+          <a:p>
+            <a:r>
+              <a:rPr lang="en-US" dirty="0" smtClean="0"/>
+              <a:t>Percent Error:                            -0.847%</a:t>
+            </a:r>
+          </a:p>
+          <a:p>
+            <a:r>
+              <a:rPr lang="en-US" dirty="0" smtClean="0"/>
+              <a:t>Standard Deviation :                 0.00018</a:t>
+            </a:r>
+          </a:p>
+          <a:p>
+            <a:r>
+              <a:rPr lang="en-US" dirty="0" smtClean="0"/>
+              <a:t>Percent Standard Deviation:   0.8911%</a:t>
+            </a:r>
+          </a:p>
+        </p:txBody>
+      </p:sp>
+      <p:sp>
+        <p:nvSpPr>
+          <p:cNvPr id="5" name="Text Placeholder 4"/>
+          <p:cNvSpPr>
+            <a:spLocks noGrp="1"/>
+          </p:cNvSpPr>
+          <p:nvPr>
+            <p:ph type="body" sz="quarter" idx="3"/>
+          </p:nvPr>
+        </p:nvSpPr>
+        <p:spPr/>
+        <p:txBody>
+          <a:bodyPr/>
+          <a:lstStyle/>
+          <a:p>
+            <a:r>
+              <a:rPr lang="en-US" dirty="0" smtClean="0"/>
+              <a:t>Test pipette</a:t>
+            </a:r>
+            <a:endParaRPr lang="en-US" dirty="0"/>
+          </a:p>
+        </p:txBody>
+      </p:sp>
+      <p:sp>
+        <p:nvSpPr>
+          <p:cNvPr id="6" name="Content Placeholder 5"/>
+          <p:cNvSpPr>
+            <a:spLocks noGrp="1"/>
+          </p:cNvSpPr>
+          <p:nvPr>
+            <p:ph sz="quarter" idx="14"/>
+          </p:nvPr>
+        </p:nvSpPr>
+        <p:spPr/>
+        <p:txBody>
+          <a:bodyPr/>
+          <a:lstStyle/>
+          <a:p>
+            <a:r>
+              <a:rPr lang="en-US" dirty="0"/>
+              <a:t>Average of ten trial :                 </a:t>
+            </a:r>
+            <a:r>
+              <a:rPr lang="en-US" dirty="0" smtClean="0"/>
+              <a:t>0.01921</a:t>
+            </a:r>
+            <a:endParaRPr lang="en-US" dirty="0"/>
+          </a:p>
+          <a:p>
+            <a:r>
+              <a:rPr lang="en-US" dirty="0"/>
+              <a:t>Percent Error:                             </a:t>
+            </a:r>
+            <a:r>
+              <a:rPr lang="en-US" dirty="0" smtClean="0"/>
+              <a:t>-3.967%</a:t>
+            </a:r>
+          </a:p>
+          <a:p>
+            <a:r>
+              <a:rPr lang="en-US" dirty="0" smtClean="0"/>
+              <a:t>Standard Deviation :                  0.00042</a:t>
+            </a:r>
+          </a:p>
+          <a:p>
+            <a:r>
+              <a:rPr lang="en-US" dirty="0" smtClean="0"/>
+              <a:t>Percent </a:t>
+            </a:r>
+            <a:r>
+              <a:rPr lang="en-US" dirty="0"/>
+              <a:t>Standard Deviation:    </a:t>
+            </a:r>
+            <a:r>
+              <a:rPr lang="en-US" dirty="0" smtClean="0"/>
+              <a:t>2.1948%</a:t>
+            </a:r>
+            <a:endParaRPr lang="en-US" dirty="0"/>
+          </a:p>
+          <a:p>
+            <a:endParaRPr lang="en-US" dirty="0"/>
+          </a:p>
+        </p:txBody>
+      </p:sp>
+    </p:spTree>
+    <p:extLst>
+      <p:ext uri="{BB962C8B-B14F-4D97-AF65-F5344CB8AC3E}">
+        <p14:creationId xmlns:p14="http://schemas.microsoft.com/office/powerpoint/2010/main" val="2847969902"/>
       </p:ext>
     </p:extLst>
   </p:cSld>

</xml_diff>